<commit_message>
Update the new presentation and the pdf
Co-authored-by: Raffaele <raffydelbasso@gmail.com>
</commit_message>
<xml_diff>
--- a/resources/EN - Suit Database + Backup Slides.pptx
+++ b/resources/EN - Suit Database + Backup Slides.pptx
@@ -2630,13 +2630,6 @@
         </dgm:presLayoutVars>
       </dgm:prSet>
       <dgm:spPr/>
-      <dgm:t>
-        <a:bodyPr/>
-        <a:lstStyle/>
-        <a:p>
-          <a:endParaRPr lang="it-IT"/>
-        </a:p>
-      </dgm:t>
     </dgm:pt>
     <dgm:pt modelId="{EBDE36D3-E8C0-418F-86FB-928E848C0BF5}" type="pres">
       <dgm:prSet presAssocID="{E666053E-3D79-4771-BE65-C04C2BC2AD50}" presName="arrow" presStyleLbl="bgShp" presStyleIdx="0" presStyleCnt="1"/>
@@ -2657,13 +2650,6 @@
         </dgm:presLayoutVars>
       </dgm:prSet>
       <dgm:spPr/>
-      <dgm:t>
-        <a:bodyPr/>
-        <a:lstStyle/>
-        <a:p>
-          <a:endParaRPr lang="it-IT"/>
-        </a:p>
-      </dgm:t>
     </dgm:pt>
     <dgm:pt modelId="{777CA0D1-C3A9-4E9E-A047-ED67ABBC9877}" type="pres">
       <dgm:prSet presAssocID="{1150D72D-0C10-464C-9872-138D62DF648B}" presName="circleA" presStyleLbl="node1" presStyleIdx="0" presStyleCnt="3"/>
@@ -2688,13 +2674,6 @@
         </dgm:presLayoutVars>
       </dgm:prSet>
       <dgm:spPr/>
-      <dgm:t>
-        <a:bodyPr/>
-        <a:lstStyle/>
-        <a:p>
-          <a:endParaRPr lang="it-IT"/>
-        </a:p>
-      </dgm:t>
     </dgm:pt>
     <dgm:pt modelId="{0B602C30-3403-4129-9AA5-09DC93D79944}" type="pres">
       <dgm:prSet presAssocID="{FCACA1BF-2174-4A81-86C9-A04196606679}" presName="circleB" presStyleLbl="node1" presStyleIdx="1" presStyleCnt="3"/>
@@ -2719,13 +2698,6 @@
         </dgm:presLayoutVars>
       </dgm:prSet>
       <dgm:spPr/>
-      <dgm:t>
-        <a:bodyPr/>
-        <a:lstStyle/>
-        <a:p>
-          <a:endParaRPr lang="it-IT"/>
-        </a:p>
-      </dgm:t>
     </dgm:pt>
     <dgm:pt modelId="{1C7346CD-1E8E-483C-951D-EFA86919A104}" type="pres">
       <dgm:prSet presAssocID="{120675D6-B069-4E20-8F32-35C919C8BA23}" presName="circleA" presStyleLbl="node1" presStyleIdx="2" presStyleCnt="3"/>
@@ -2737,13 +2709,13 @@
     </dgm:pt>
   </dgm:ptLst>
   <dgm:cxnLst>
-    <dgm:cxn modelId="{AC469BCC-71FE-4AB9-A9B7-51173E73C44C}" type="presOf" srcId="{FCACA1BF-2174-4A81-86C9-A04196606679}" destId="{F0981BCC-5A6F-4813-B909-CCCB4E54497E}" srcOrd="0" destOrd="0" presId="urn:microsoft.com/office/officeart/2005/8/layout/hProcess11"/>
     <dgm:cxn modelId="{F67BD712-B677-41D6-969A-10A5FF8B8619}" type="presOf" srcId="{1150D72D-0C10-464C-9872-138D62DF648B}" destId="{D36D539B-D61D-48B2-97B1-C758C354082D}" srcOrd="0" destOrd="0" presId="urn:microsoft.com/office/officeart/2005/8/layout/hProcess11"/>
+    <dgm:cxn modelId="{5033BF29-7327-40BC-A2D3-4C032B2BC09C}" srcId="{E666053E-3D79-4771-BE65-C04C2BC2AD50}" destId="{FCACA1BF-2174-4A81-86C9-A04196606679}" srcOrd="1" destOrd="0" parTransId="{E65C6AAA-B40B-4424-B0E9-B2FD7E21B4C0}" sibTransId="{34ACB9D4-7819-4D5F-83E8-E22B74644466}"/>
+    <dgm:cxn modelId="{328CCA60-B237-40A9-88E1-7DBCA1409FEC}" srcId="{E666053E-3D79-4771-BE65-C04C2BC2AD50}" destId="{120675D6-B069-4E20-8F32-35C919C8BA23}" srcOrd="2" destOrd="0" parTransId="{F40B4AD2-3C33-463F-9415-DDE2C620B076}" sibTransId="{BE897384-D9ED-4A73-A0A4-421705B53747}"/>
     <dgm:cxn modelId="{D37D7E45-51E7-4B11-9469-2EAD1F4E55F5}" type="presOf" srcId="{E666053E-3D79-4771-BE65-C04C2BC2AD50}" destId="{13216F34-50F9-414F-AEC8-364592126A8B}" srcOrd="0" destOrd="0" presId="urn:microsoft.com/office/officeart/2005/8/layout/hProcess11"/>
-    <dgm:cxn modelId="{328CCA60-B237-40A9-88E1-7DBCA1409FEC}" srcId="{E666053E-3D79-4771-BE65-C04C2BC2AD50}" destId="{120675D6-B069-4E20-8F32-35C919C8BA23}" srcOrd="2" destOrd="0" parTransId="{F40B4AD2-3C33-463F-9415-DDE2C620B076}" sibTransId="{BE897384-D9ED-4A73-A0A4-421705B53747}"/>
     <dgm:cxn modelId="{A8EBE547-156B-4898-9D90-AAE3AF8157A2}" srcId="{E666053E-3D79-4771-BE65-C04C2BC2AD50}" destId="{1150D72D-0C10-464C-9872-138D62DF648B}" srcOrd="0" destOrd="0" parTransId="{C0B6FB3E-1DFF-4597-A429-21337521FAC5}" sibTransId="{46298429-EA59-4C61-8CD6-D143BAA8A75B}"/>
     <dgm:cxn modelId="{616E4FBB-1CC9-4F97-9C0F-AFFBF93D58F4}" type="presOf" srcId="{120675D6-B069-4E20-8F32-35C919C8BA23}" destId="{BB5A5C39-6A0D-4FA5-9B2E-A7D0ACF97328}" srcOrd="0" destOrd="0" presId="urn:microsoft.com/office/officeart/2005/8/layout/hProcess11"/>
-    <dgm:cxn modelId="{5033BF29-7327-40BC-A2D3-4C032B2BC09C}" srcId="{E666053E-3D79-4771-BE65-C04C2BC2AD50}" destId="{FCACA1BF-2174-4A81-86C9-A04196606679}" srcOrd="1" destOrd="0" parTransId="{E65C6AAA-B40B-4424-B0E9-B2FD7E21B4C0}" sibTransId="{34ACB9D4-7819-4D5F-83E8-E22B74644466}"/>
+    <dgm:cxn modelId="{AC469BCC-71FE-4AB9-A9B7-51173E73C44C}" type="presOf" srcId="{FCACA1BF-2174-4A81-86C9-A04196606679}" destId="{F0981BCC-5A6F-4813-B909-CCCB4E54497E}" srcOrd="0" destOrd="0" presId="urn:microsoft.com/office/officeart/2005/8/layout/hProcess11"/>
     <dgm:cxn modelId="{C0EB2210-8E06-4820-9839-1C963A53C131}" type="presParOf" srcId="{13216F34-50F9-414F-AEC8-364592126A8B}" destId="{EBDE36D3-E8C0-418F-86FB-928E848C0BF5}" srcOrd="0" destOrd="0" presId="urn:microsoft.com/office/officeart/2005/8/layout/hProcess11"/>
     <dgm:cxn modelId="{4E04AFCD-4DD4-496E-97AB-9D16F0F13641}" type="presParOf" srcId="{13216F34-50F9-414F-AEC8-364592126A8B}" destId="{473E038B-0241-401C-BDEF-8561B8B7D8F9}" srcOrd="1" destOrd="0" presId="urn:microsoft.com/office/officeart/2005/8/layout/hProcess11"/>
     <dgm:cxn modelId="{7DB0F3CA-3C2D-4564-8F02-07DDAF081890}" type="presParOf" srcId="{473E038B-0241-401C-BDEF-8561B8B7D8F9}" destId="{D1985FAE-4357-4F5B-88F4-8F9D69F58B03}" srcOrd="0" destOrd="0" presId="urn:microsoft.com/office/officeart/2005/8/layout/hProcess11"/>
@@ -2965,13 +2937,6 @@
         </dgm:presLayoutVars>
       </dgm:prSet>
       <dgm:spPr/>
-      <dgm:t>
-        <a:bodyPr/>
-        <a:lstStyle/>
-        <a:p>
-          <a:endParaRPr lang="it-IT"/>
-        </a:p>
-      </dgm:t>
     </dgm:pt>
     <dgm:pt modelId="{22F4EDAC-46AC-4915-AB74-7BF195FE2CDD}" type="pres">
       <dgm:prSet presAssocID="{1150D72D-0C10-464C-9872-138D62DF648B}" presName="circleA" presStyleLbl="node1" presStyleIdx="0" presStyleCnt="4"/>
@@ -2996,13 +2961,6 @@
         </dgm:presLayoutVars>
       </dgm:prSet>
       <dgm:spPr/>
-      <dgm:t>
-        <a:bodyPr/>
-        <a:lstStyle/>
-        <a:p>
-          <a:endParaRPr lang="it-IT"/>
-        </a:p>
-      </dgm:t>
     </dgm:pt>
     <dgm:pt modelId="{D5E05DE0-2866-4D94-B256-A1A08597DD8A}" type="pres">
       <dgm:prSet presAssocID="{FCACA1BF-2174-4A81-86C9-A04196606679}" presName="circleB" presStyleLbl="node1" presStyleIdx="1" presStyleCnt="4"/>
@@ -3027,13 +2985,6 @@
         </dgm:presLayoutVars>
       </dgm:prSet>
       <dgm:spPr/>
-      <dgm:t>
-        <a:bodyPr/>
-        <a:lstStyle/>
-        <a:p>
-          <a:endParaRPr lang="it-IT"/>
-        </a:p>
-      </dgm:t>
     </dgm:pt>
     <dgm:pt modelId="{EFDC1143-41B6-4D4C-913A-BDDE0C3061F8}" type="pres">
       <dgm:prSet presAssocID="{7D612A01-648C-4B53-8E34-57CD9A945DB3}" presName="circleA" presStyleLbl="node1" presStyleIdx="2" presStyleCnt="4"/>
@@ -3058,13 +3009,6 @@
         </dgm:presLayoutVars>
       </dgm:prSet>
       <dgm:spPr/>
-      <dgm:t>
-        <a:bodyPr/>
-        <a:lstStyle/>
-        <a:p>
-          <a:endParaRPr lang="it-IT"/>
-        </a:p>
-      </dgm:t>
     </dgm:pt>
     <dgm:pt modelId="{0387E4F1-8339-44C1-BD70-A8BB4FD8E780}" type="pres">
       <dgm:prSet presAssocID="{120675D6-B069-4E20-8F32-35C919C8BA23}" presName="circleB" presStyleLbl="node1" presStyleIdx="3" presStyleCnt="4"/>
@@ -3076,15 +3020,15 @@
     </dgm:pt>
   </dgm:ptLst>
   <dgm:cxnLst>
-    <dgm:cxn modelId="{1BFE54EC-2425-48DB-8F1B-7E0B6F47FCDA}" type="presOf" srcId="{FCACA1BF-2174-4A81-86C9-A04196606679}" destId="{D82B4BDE-124E-4CBC-8835-F25E658EE271}" srcOrd="0" destOrd="0" presId="urn:microsoft.com/office/officeart/2005/8/layout/hProcess11"/>
-    <dgm:cxn modelId="{A5E77CBB-A84D-43CC-B38B-171B97545B31}" type="presOf" srcId="{120675D6-B069-4E20-8F32-35C919C8BA23}" destId="{46710E05-D3EE-4ECE-ADD9-00A6BDC96E55}" srcOrd="0" destOrd="0" presId="urn:microsoft.com/office/officeart/2005/8/layout/hProcess11"/>
-    <dgm:cxn modelId="{25BFC5CA-03A4-4D2C-BE61-6D847325F6FF}" type="presOf" srcId="{7D612A01-648C-4B53-8E34-57CD9A945DB3}" destId="{28222BC8-2757-4DC9-A59C-246F935252BB}" srcOrd="0" destOrd="0" presId="urn:microsoft.com/office/officeart/2005/8/layout/hProcess11"/>
+    <dgm:cxn modelId="{E03C8A0E-F5ED-4F04-86B6-84ADF4BACD9C}" type="presOf" srcId="{1150D72D-0C10-464C-9872-138D62DF648B}" destId="{D72E86D6-CFF3-4592-9A0A-66EA537599E6}" srcOrd="0" destOrd="0" presId="urn:microsoft.com/office/officeart/2005/8/layout/hProcess11"/>
+    <dgm:cxn modelId="{5033BF29-7327-40BC-A2D3-4C032B2BC09C}" srcId="{E666053E-3D79-4771-BE65-C04C2BC2AD50}" destId="{FCACA1BF-2174-4A81-86C9-A04196606679}" srcOrd="1" destOrd="0" parTransId="{E65C6AAA-B40B-4424-B0E9-B2FD7E21B4C0}" sibTransId="{34ACB9D4-7819-4D5F-83E8-E22B74644466}"/>
     <dgm:cxn modelId="{328CCA60-B237-40A9-88E1-7DBCA1409FEC}" srcId="{E666053E-3D79-4771-BE65-C04C2BC2AD50}" destId="{120675D6-B069-4E20-8F32-35C919C8BA23}" srcOrd="3" destOrd="0" parTransId="{F40B4AD2-3C33-463F-9415-DDE2C620B076}" sibTransId="{BE897384-D9ED-4A73-A0A4-421705B53747}"/>
     <dgm:cxn modelId="{A8EBE547-156B-4898-9D90-AAE3AF8157A2}" srcId="{E666053E-3D79-4771-BE65-C04C2BC2AD50}" destId="{1150D72D-0C10-464C-9872-138D62DF648B}" srcOrd="0" destOrd="0" parTransId="{C0B6FB3E-1DFF-4597-A429-21337521FAC5}" sibTransId="{46298429-EA59-4C61-8CD6-D143BAA8A75B}"/>
     <dgm:cxn modelId="{CAE12356-1E2A-42FD-B87E-EDC06E529EA6}" srcId="{E666053E-3D79-4771-BE65-C04C2BC2AD50}" destId="{7D612A01-648C-4B53-8E34-57CD9A945DB3}" srcOrd="2" destOrd="0" parTransId="{BC058E27-8206-43EA-BBC8-F8B1DD581125}" sibTransId="{0FF3D4CF-1253-4437-9559-CBD136E576B8}"/>
-    <dgm:cxn modelId="{E03C8A0E-F5ED-4F04-86B6-84ADF4BACD9C}" type="presOf" srcId="{1150D72D-0C10-464C-9872-138D62DF648B}" destId="{D72E86D6-CFF3-4592-9A0A-66EA537599E6}" srcOrd="0" destOrd="0" presId="urn:microsoft.com/office/officeart/2005/8/layout/hProcess11"/>
+    <dgm:cxn modelId="{A5E77CBB-A84D-43CC-B38B-171B97545B31}" type="presOf" srcId="{120675D6-B069-4E20-8F32-35C919C8BA23}" destId="{46710E05-D3EE-4ECE-ADD9-00A6BDC96E55}" srcOrd="0" destOrd="0" presId="urn:microsoft.com/office/officeart/2005/8/layout/hProcess11"/>
+    <dgm:cxn modelId="{25BFC5CA-03A4-4D2C-BE61-6D847325F6FF}" type="presOf" srcId="{7D612A01-648C-4B53-8E34-57CD9A945DB3}" destId="{28222BC8-2757-4DC9-A59C-246F935252BB}" srcOrd="0" destOrd="0" presId="urn:microsoft.com/office/officeart/2005/8/layout/hProcess11"/>
     <dgm:cxn modelId="{A59484D4-B3BE-456D-89EB-D53116A2A488}" type="presOf" srcId="{E666053E-3D79-4771-BE65-C04C2BC2AD50}" destId="{170F9913-FFD7-4DFF-A5FB-C40DEEAEC47C}" srcOrd="0" destOrd="0" presId="urn:microsoft.com/office/officeart/2005/8/layout/hProcess11"/>
-    <dgm:cxn modelId="{5033BF29-7327-40BC-A2D3-4C032B2BC09C}" srcId="{E666053E-3D79-4771-BE65-C04C2BC2AD50}" destId="{FCACA1BF-2174-4A81-86C9-A04196606679}" srcOrd="1" destOrd="0" parTransId="{E65C6AAA-B40B-4424-B0E9-B2FD7E21B4C0}" sibTransId="{34ACB9D4-7819-4D5F-83E8-E22B74644466}"/>
+    <dgm:cxn modelId="{1BFE54EC-2425-48DB-8F1B-7E0B6F47FCDA}" type="presOf" srcId="{FCACA1BF-2174-4A81-86C9-A04196606679}" destId="{D82B4BDE-124E-4CBC-8835-F25E658EE271}" srcOrd="0" destOrd="0" presId="urn:microsoft.com/office/officeart/2005/8/layout/hProcess11"/>
     <dgm:cxn modelId="{A6ED0DCD-8D3C-43ED-B3CA-960741B3C1EE}" type="presParOf" srcId="{170F9913-FFD7-4DFF-A5FB-C40DEEAEC47C}" destId="{7861B813-56D6-450C-8771-97B6D07DC7B5}" srcOrd="0" destOrd="0" presId="urn:microsoft.com/office/officeart/2005/8/layout/hProcess11"/>
     <dgm:cxn modelId="{81D9A59E-9201-4B31-952F-47C86392CD91}" type="presParOf" srcId="{170F9913-FFD7-4DFF-A5FB-C40DEEAEC47C}" destId="{8BE51599-643C-4C0D-B0F0-52E59281DDF2}" srcOrd="1" destOrd="0" presId="urn:microsoft.com/office/officeart/2005/8/layout/hProcess11"/>
     <dgm:cxn modelId="{05DD98A3-88B4-44A8-A8FB-9A0865476E11}" type="presParOf" srcId="{8BE51599-643C-4C0D-B0F0-52E59281DDF2}" destId="{481A7EC0-158E-4322-820C-8F5AA5FD4EAB}" srcOrd="0" destOrd="0" presId="urn:microsoft.com/office/officeart/2005/8/layout/hProcess11"/>
@@ -3263,13 +3207,6 @@
         </dgm:presLayoutVars>
       </dgm:prSet>
       <dgm:spPr/>
-      <dgm:t>
-        <a:bodyPr/>
-        <a:lstStyle/>
-        <a:p>
-          <a:endParaRPr lang="it-IT"/>
-        </a:p>
-      </dgm:t>
     </dgm:pt>
     <dgm:pt modelId="{3EF33671-0A6D-4C47-986B-313AA218EDBA}" type="pres">
       <dgm:prSet presAssocID="{1150D72D-0C10-464C-9872-138D62DF648B}" presName="circleA" presStyleLbl="node1" presStyleIdx="0" presStyleCnt="3"/>
@@ -3294,13 +3231,6 @@
         </dgm:presLayoutVars>
       </dgm:prSet>
       <dgm:spPr/>
-      <dgm:t>
-        <a:bodyPr/>
-        <a:lstStyle/>
-        <a:p>
-          <a:endParaRPr lang="it-IT"/>
-        </a:p>
-      </dgm:t>
     </dgm:pt>
     <dgm:pt modelId="{3E203939-64F9-4670-B91D-539E5B3107E8}" type="pres">
       <dgm:prSet presAssocID="{FCACA1BF-2174-4A81-86C9-A04196606679}" presName="circleB" presStyleLbl="node1" presStyleIdx="1" presStyleCnt="3"/>
@@ -3325,13 +3255,6 @@
         </dgm:presLayoutVars>
       </dgm:prSet>
       <dgm:spPr/>
-      <dgm:t>
-        <a:bodyPr/>
-        <a:lstStyle/>
-        <a:p>
-          <a:endParaRPr lang="it-IT"/>
-        </a:p>
-      </dgm:t>
     </dgm:pt>
     <dgm:pt modelId="{4B4E30F9-349C-49BF-9704-A4F0E375DC5A}" type="pres">
       <dgm:prSet presAssocID="{120675D6-B069-4E20-8F32-35C919C8BA23}" presName="circleA" presStyleLbl="node1" presStyleIdx="2" presStyleCnt="3"/>
@@ -3343,13 +3266,13 @@
     </dgm:pt>
   </dgm:ptLst>
   <dgm:cxnLst>
-    <dgm:cxn modelId="{137207A4-27C9-4314-8728-86D0615E7508}" type="presOf" srcId="{FCACA1BF-2174-4A81-86C9-A04196606679}" destId="{CC006808-FB4C-447E-97F5-0F64B5D1DA26}" srcOrd="0" destOrd="0" presId="urn:microsoft.com/office/officeart/2005/8/layout/hProcess11"/>
+    <dgm:cxn modelId="{5033BF29-7327-40BC-A2D3-4C032B2BC09C}" srcId="{E666053E-3D79-4771-BE65-C04C2BC2AD50}" destId="{FCACA1BF-2174-4A81-86C9-A04196606679}" srcOrd="1" destOrd="0" parTransId="{E65C6AAA-B40B-4424-B0E9-B2FD7E21B4C0}" sibTransId="{34ACB9D4-7819-4D5F-83E8-E22B74644466}"/>
+    <dgm:cxn modelId="{16590D3C-1800-44BF-9465-4F0BACE4E58B}" type="presOf" srcId="{120675D6-B069-4E20-8F32-35C919C8BA23}" destId="{FA04BCEE-3D91-4837-9F87-4C08A54AF4A8}" srcOrd="0" destOrd="0" presId="urn:microsoft.com/office/officeart/2005/8/layout/hProcess11"/>
     <dgm:cxn modelId="{328CCA60-B237-40A9-88E1-7DBCA1409FEC}" srcId="{E666053E-3D79-4771-BE65-C04C2BC2AD50}" destId="{120675D6-B069-4E20-8F32-35C919C8BA23}" srcOrd="2" destOrd="0" parTransId="{F40B4AD2-3C33-463F-9415-DDE2C620B076}" sibTransId="{BE897384-D9ED-4A73-A0A4-421705B53747}"/>
     <dgm:cxn modelId="{A8EBE547-156B-4898-9D90-AAE3AF8157A2}" srcId="{E666053E-3D79-4771-BE65-C04C2BC2AD50}" destId="{1150D72D-0C10-464C-9872-138D62DF648B}" srcOrd="0" destOrd="0" parTransId="{C0B6FB3E-1DFF-4597-A429-21337521FAC5}" sibTransId="{46298429-EA59-4C61-8CD6-D143BAA8A75B}"/>
+    <dgm:cxn modelId="{137207A4-27C9-4314-8728-86D0615E7508}" type="presOf" srcId="{FCACA1BF-2174-4A81-86C9-A04196606679}" destId="{CC006808-FB4C-447E-97F5-0F64B5D1DA26}" srcOrd="0" destOrd="0" presId="urn:microsoft.com/office/officeart/2005/8/layout/hProcess11"/>
     <dgm:cxn modelId="{444B25B1-7942-4AD4-B238-4740198654F9}" type="presOf" srcId="{E666053E-3D79-4771-BE65-C04C2BC2AD50}" destId="{97E64063-E905-47F4-B707-40BD8349C4EB}" srcOrd="0" destOrd="0" presId="urn:microsoft.com/office/officeart/2005/8/layout/hProcess11"/>
     <dgm:cxn modelId="{FBEA79B8-78AD-4393-9F11-4E5AE6D82DDB}" type="presOf" srcId="{1150D72D-0C10-464C-9872-138D62DF648B}" destId="{400E3B27-10E5-47C4-80AE-C667F7D40276}" srcOrd="0" destOrd="0" presId="urn:microsoft.com/office/officeart/2005/8/layout/hProcess11"/>
-    <dgm:cxn modelId="{5033BF29-7327-40BC-A2D3-4C032B2BC09C}" srcId="{E666053E-3D79-4771-BE65-C04C2BC2AD50}" destId="{FCACA1BF-2174-4A81-86C9-A04196606679}" srcOrd="1" destOrd="0" parTransId="{E65C6AAA-B40B-4424-B0E9-B2FD7E21B4C0}" sibTransId="{34ACB9D4-7819-4D5F-83E8-E22B74644466}"/>
-    <dgm:cxn modelId="{16590D3C-1800-44BF-9465-4F0BACE4E58B}" type="presOf" srcId="{120675D6-B069-4E20-8F32-35C919C8BA23}" destId="{FA04BCEE-3D91-4837-9F87-4C08A54AF4A8}" srcOrd="0" destOrd="0" presId="urn:microsoft.com/office/officeart/2005/8/layout/hProcess11"/>
     <dgm:cxn modelId="{1AAB59C3-99AF-4772-AA74-C795A3CAE839}" type="presParOf" srcId="{97E64063-E905-47F4-B707-40BD8349C4EB}" destId="{2004B2C4-1F04-49F0-B137-16531C5D0095}" srcOrd="0" destOrd="0" presId="urn:microsoft.com/office/officeart/2005/8/layout/hProcess11"/>
     <dgm:cxn modelId="{28AA514A-E83B-40D4-BF1B-B4EF420B0B2E}" type="presParOf" srcId="{97E64063-E905-47F4-B707-40BD8349C4EB}" destId="{24D56B25-E18D-481C-B268-7157F8FFDF4F}" srcOrd="1" destOrd="0" presId="urn:microsoft.com/office/officeart/2005/8/layout/hProcess11"/>
     <dgm:cxn modelId="{6BB05878-4DAE-4ED6-B993-8C769873FAE0}" type="presParOf" srcId="{24D56B25-E18D-481C-B268-7157F8FFDF4F}" destId="{B2E60CE2-6849-42AC-B79D-7F8D2DD38FD1}" srcOrd="0" destOrd="0" presId="urn:microsoft.com/office/officeart/2005/8/layout/hProcess11"/>
@@ -3462,7 +3385,7 @@
         </a:bodyPr>
         <a:lstStyle/>
         <a:p>
-          <a:pPr lvl="0" algn="ctr" defTabSz="1066800">
+          <a:pPr marL="0" lvl="0" indent="0" algn="ctr" defTabSz="1066800">
             <a:lnSpc>
               <a:spcPct val="90000"/>
             </a:lnSpc>
@@ -3472,6 +3395,7 @@
             <a:spcAft>
               <a:spcPct val="35000"/>
             </a:spcAft>
+            <a:buNone/>
           </a:pPr>
           <a:r>
             <a:rPr lang="it-IT" sz="2400" kern="1200" dirty="0"/>
@@ -3572,7 +3496,7 @@
         </a:bodyPr>
         <a:lstStyle/>
         <a:p>
-          <a:pPr lvl="0" algn="ctr" defTabSz="1066800">
+          <a:pPr marL="0" lvl="0" indent="0" algn="ctr" defTabSz="1066800">
             <a:lnSpc>
               <a:spcPct val="90000"/>
             </a:lnSpc>
@@ -3582,6 +3506,7 @@
             <a:spcAft>
               <a:spcPct val="35000"/>
             </a:spcAft>
+            <a:buNone/>
           </a:pPr>
           <a:r>
             <a:rPr lang="it-IT" sz="2400" kern="1200" dirty="0"/>
@@ -3682,7 +3607,7 @@
         </a:bodyPr>
         <a:lstStyle/>
         <a:p>
-          <a:pPr lvl="0" algn="ctr" defTabSz="1066800">
+          <a:pPr marL="0" lvl="0" indent="0" algn="ctr" defTabSz="1066800">
             <a:lnSpc>
               <a:spcPct val="90000"/>
             </a:lnSpc>
@@ -3692,6 +3617,7 @@
             <a:spcAft>
               <a:spcPct val="35000"/>
             </a:spcAft>
+            <a:buNone/>
           </a:pPr>
           <a:r>
             <a:rPr lang="it-IT" sz="2400" kern="1200" dirty="0"/>
@@ -3844,7 +3770,7 @@
         </a:bodyPr>
         <a:lstStyle/>
         <a:p>
-          <a:pPr lvl="0" algn="ctr" defTabSz="889000">
+          <a:pPr marL="0" lvl="0" indent="0" algn="ctr" defTabSz="889000">
             <a:lnSpc>
               <a:spcPct val="90000"/>
             </a:lnSpc>
@@ -3854,6 +3780,7 @@
             <a:spcAft>
               <a:spcPct val="35000"/>
             </a:spcAft>
+            <a:buNone/>
           </a:pPr>
           <a:r>
             <a:rPr lang="it-IT" sz="2000" kern="1200" dirty="0"/>
@@ -3954,7 +3881,7 @@
         </a:bodyPr>
         <a:lstStyle/>
         <a:p>
-          <a:pPr lvl="0" algn="ctr" defTabSz="1066800">
+          <a:pPr marL="0" lvl="0" indent="0" algn="ctr" defTabSz="1066800">
             <a:lnSpc>
               <a:spcPct val="90000"/>
             </a:lnSpc>
@@ -3964,6 +3891,7 @@
             <a:spcAft>
               <a:spcPct val="35000"/>
             </a:spcAft>
+            <a:buNone/>
           </a:pPr>
           <a:r>
             <a:rPr lang="it-IT" sz="2400" kern="1200" dirty="0"/>
@@ -4064,7 +3992,7 @@
         </a:bodyPr>
         <a:lstStyle/>
         <a:p>
-          <a:pPr lvl="0" algn="ctr" defTabSz="1066800">
+          <a:pPr marL="0" lvl="0" indent="0" algn="ctr" defTabSz="1066800">
             <a:lnSpc>
               <a:spcPct val="90000"/>
             </a:lnSpc>
@@ -4074,6 +4002,7 @@
             <a:spcAft>
               <a:spcPct val="35000"/>
             </a:spcAft>
+            <a:buNone/>
           </a:pPr>
           <a:r>
             <a:rPr lang="it-IT" sz="2400" kern="1200" dirty="0"/>
@@ -4182,7 +4111,7 @@
         </a:bodyPr>
         <a:lstStyle/>
         <a:p>
-          <a:pPr lvl="0" algn="ctr" defTabSz="800100">
+          <a:pPr marL="0" lvl="0" indent="0" algn="ctr" defTabSz="800100">
             <a:lnSpc>
               <a:spcPct val="90000"/>
             </a:lnSpc>
@@ -4192,6 +4121,7 @@
             <a:spcAft>
               <a:spcPct val="35000"/>
             </a:spcAft>
+            <a:buNone/>
           </a:pPr>
           <a:r>
             <a:rPr lang="it-IT" sz="1800" kern="1200" dirty="0"/>
@@ -4344,7 +4274,7 @@
         </a:bodyPr>
         <a:lstStyle/>
         <a:p>
-          <a:pPr lvl="0" algn="ctr" defTabSz="1066800">
+          <a:pPr marL="0" lvl="0" indent="0" algn="ctr" defTabSz="1066800">
             <a:lnSpc>
               <a:spcPct val="90000"/>
             </a:lnSpc>
@@ -4354,6 +4284,7 @@
             <a:spcAft>
               <a:spcPct val="35000"/>
             </a:spcAft>
+            <a:buNone/>
           </a:pPr>
           <a:r>
             <a:rPr lang="it-IT" sz="2400" kern="1200"/>
@@ -4453,7 +4384,7 @@
         </a:bodyPr>
         <a:lstStyle/>
         <a:p>
-          <a:pPr lvl="0" algn="ctr" defTabSz="889000">
+          <a:pPr marL="0" lvl="0" indent="0" algn="ctr" defTabSz="889000">
             <a:lnSpc>
               <a:spcPct val="90000"/>
             </a:lnSpc>
@@ -4463,6 +4394,7 @@
             <a:spcAft>
               <a:spcPct val="35000"/>
             </a:spcAft>
+            <a:buNone/>
           </a:pPr>
           <a:r>
             <a:rPr lang="it-IT" sz="2000" kern="1200"/>
@@ -4562,7 +4494,7 @@
         </a:bodyPr>
         <a:lstStyle/>
         <a:p>
-          <a:pPr lvl="0" algn="ctr" defTabSz="1066800">
+          <a:pPr marL="0" lvl="0" indent="0" algn="ctr" defTabSz="1066800">
             <a:lnSpc>
               <a:spcPct val="90000"/>
             </a:lnSpc>
@@ -4572,6 +4504,7 @@
             <a:spcAft>
               <a:spcPct val="35000"/>
             </a:spcAft>
+            <a:buNone/>
           </a:pPr>
           <a:r>
             <a:rPr lang="it-IT" sz="2400" kern="1200" dirty="0"/>
@@ -8698,7 +8631,7 @@
           <a:p>
             <a:fld id="{6705913C-D455-491B-A56E-B276DCE62E7A}" type="datetimeFigureOut">
               <a:rPr lang="it-IT" smtClean="0"/>
-              <a:t>25/05/2019</a:t>
+              <a:t>26/05/2019</a:t>
             </a:fld>
             <a:endParaRPr lang="it-IT"/>
           </a:p>
@@ -8740,7 +8673,7 @@
           <a:p>
             <a:fld id="{F22D0480-470F-45BA-8A2B-522EE741392B}" type="slidenum">
               <a:rPr lang="it-IT" smtClean="0"/>
-              <a:t>‹N›</a:t>
+              <a:t>‹#›</a:t>
             </a:fld>
             <a:endParaRPr lang="it-IT"/>
           </a:p>
@@ -8868,7 +8801,7 @@
           <a:p>
             <a:fld id="{6705913C-D455-491B-A56E-B276DCE62E7A}" type="datetimeFigureOut">
               <a:rPr lang="it-IT" smtClean="0"/>
-              <a:t>25/05/2019</a:t>
+              <a:t>26/05/2019</a:t>
             </a:fld>
             <a:endParaRPr lang="it-IT"/>
           </a:p>
@@ -8910,7 +8843,7 @@
           <a:p>
             <a:fld id="{F22D0480-470F-45BA-8A2B-522EE741392B}" type="slidenum">
               <a:rPr lang="it-IT" smtClean="0"/>
-              <a:t>‹N›</a:t>
+              <a:t>‹#›</a:t>
             </a:fld>
             <a:endParaRPr lang="it-IT"/>
           </a:p>
@@ -9048,7 +8981,7 @@
           <a:p>
             <a:fld id="{6705913C-D455-491B-A56E-B276DCE62E7A}" type="datetimeFigureOut">
               <a:rPr lang="it-IT" smtClean="0"/>
-              <a:t>25/05/2019</a:t>
+              <a:t>26/05/2019</a:t>
             </a:fld>
             <a:endParaRPr lang="it-IT"/>
           </a:p>
@@ -9090,7 +9023,7 @@
           <a:p>
             <a:fld id="{F22D0480-470F-45BA-8A2B-522EE741392B}" type="slidenum">
               <a:rPr lang="it-IT" smtClean="0"/>
-              <a:t>‹N›</a:t>
+              <a:t>‹#›</a:t>
             </a:fld>
             <a:endParaRPr lang="it-IT"/>
           </a:p>
@@ -9270,7 +9203,7 @@
           <a:p>
             <a:fld id="{6705913C-D455-491B-A56E-B276DCE62E7A}" type="datetimeFigureOut">
               <a:rPr lang="it-IT" smtClean="0"/>
-              <a:t>25/05/2019</a:t>
+              <a:t>26/05/2019</a:t>
             </a:fld>
             <a:endParaRPr lang="it-IT"/>
           </a:p>
@@ -9338,7 +9271,7 @@
           <a:p>
             <a:fld id="{F22D0480-470F-45BA-8A2B-522EE741392B}" type="slidenum">
               <a:rPr lang="it-IT" smtClean="0"/>
-              <a:t>‹N›</a:t>
+              <a:t>‹#›</a:t>
             </a:fld>
             <a:endParaRPr lang="it-IT"/>
           </a:p>
@@ -9595,7 +9528,7 @@
           <a:p>
             <a:fld id="{6705913C-D455-491B-A56E-B276DCE62E7A}" type="datetimeFigureOut">
               <a:rPr lang="it-IT" smtClean="0"/>
-              <a:t>25/05/2019</a:t>
+              <a:t>26/05/2019</a:t>
             </a:fld>
             <a:endParaRPr lang="it-IT"/>
           </a:p>
@@ -9637,7 +9570,7 @@
           <a:p>
             <a:fld id="{F22D0480-470F-45BA-8A2B-522EE741392B}" type="slidenum">
               <a:rPr lang="it-IT" smtClean="0"/>
-              <a:t>‹N›</a:t>
+              <a:t>‹#›</a:t>
             </a:fld>
             <a:endParaRPr lang="it-IT"/>
           </a:p>
@@ -9867,7 +9800,7 @@
           <a:p>
             <a:fld id="{6705913C-D455-491B-A56E-B276DCE62E7A}" type="datetimeFigureOut">
               <a:rPr lang="it-IT" smtClean="0"/>
-              <a:t>25/05/2019</a:t>
+              <a:t>26/05/2019</a:t>
             </a:fld>
             <a:endParaRPr lang="it-IT"/>
           </a:p>
@@ -9935,7 +9868,7 @@
           <a:p>
             <a:fld id="{F22D0480-470F-45BA-8A2B-522EE741392B}" type="slidenum">
               <a:rPr lang="it-IT" smtClean="0"/>
-              <a:t>‹N›</a:t>
+              <a:t>‹#›</a:t>
             </a:fld>
             <a:endParaRPr lang="it-IT"/>
           </a:p>
@@ -10261,7 +10194,7 @@
           <a:p>
             <a:fld id="{6705913C-D455-491B-A56E-B276DCE62E7A}" type="datetimeFigureOut">
               <a:rPr lang="it-IT" smtClean="0"/>
-              <a:t>25/05/2019</a:t>
+              <a:t>26/05/2019</a:t>
             </a:fld>
             <a:endParaRPr lang="it-IT"/>
           </a:p>
@@ -10303,7 +10236,7 @@
           <a:p>
             <a:fld id="{F22D0480-470F-45BA-8A2B-522EE741392B}" type="slidenum">
               <a:rPr lang="it-IT" smtClean="0"/>
-              <a:t>‹N›</a:t>
+              <a:t>‹#›</a:t>
             </a:fld>
             <a:endParaRPr lang="it-IT"/>
           </a:p>
@@ -10738,7 +10671,7 @@
           <a:p>
             <a:fld id="{6705913C-D455-491B-A56E-B276DCE62E7A}" type="datetimeFigureOut">
               <a:rPr lang="it-IT" smtClean="0"/>
-              <a:t>25/05/2019</a:t>
+              <a:t>26/05/2019</a:t>
             </a:fld>
             <a:endParaRPr lang="it-IT"/>
           </a:p>
@@ -10780,7 +10713,7 @@
           <a:p>
             <a:fld id="{F22D0480-470F-45BA-8A2B-522EE741392B}" type="slidenum">
               <a:rPr lang="it-IT" smtClean="0"/>
-              <a:t>‹N›</a:t>
+              <a:t>‹#›</a:t>
             </a:fld>
             <a:endParaRPr lang="it-IT"/>
           </a:p>
@@ -10856,7 +10789,7 @@
           <a:p>
             <a:fld id="{6705913C-D455-491B-A56E-B276DCE62E7A}" type="datetimeFigureOut">
               <a:rPr lang="it-IT" smtClean="0"/>
-              <a:t>25/05/2019</a:t>
+              <a:t>26/05/2019</a:t>
             </a:fld>
             <a:endParaRPr lang="it-IT"/>
           </a:p>
@@ -10898,7 +10831,7 @@
           <a:p>
             <a:fld id="{F22D0480-470F-45BA-8A2B-522EE741392B}" type="slidenum">
               <a:rPr lang="it-IT" smtClean="0"/>
-              <a:t>‹N›</a:t>
+              <a:t>‹#›</a:t>
             </a:fld>
             <a:endParaRPr lang="it-IT"/>
           </a:p>
@@ -10951,7 +10884,7 @@
           <a:p>
             <a:fld id="{6705913C-D455-491B-A56E-B276DCE62E7A}" type="datetimeFigureOut">
               <a:rPr lang="it-IT" smtClean="0"/>
-              <a:t>25/05/2019</a:t>
+              <a:t>26/05/2019</a:t>
             </a:fld>
             <a:endParaRPr lang="it-IT"/>
           </a:p>
@@ -10993,7 +10926,7 @@
           <a:p>
             <a:fld id="{F22D0480-470F-45BA-8A2B-522EE741392B}" type="slidenum">
               <a:rPr lang="it-IT" smtClean="0"/>
-              <a:t>‹N›</a:t>
+              <a:t>‹#›</a:t>
             </a:fld>
             <a:endParaRPr lang="it-IT"/>
           </a:p>
@@ -11297,7 +11230,7 @@
           <a:p>
             <a:fld id="{6705913C-D455-491B-A56E-B276DCE62E7A}" type="datetimeFigureOut">
               <a:rPr lang="it-IT" smtClean="0"/>
-              <a:t>25/05/2019</a:t>
+              <a:t>26/05/2019</a:t>
             </a:fld>
             <a:endParaRPr lang="it-IT"/>
           </a:p>
@@ -11365,7 +11298,7 @@
           <a:p>
             <a:fld id="{F22D0480-470F-45BA-8A2B-522EE741392B}" type="slidenum">
               <a:rPr lang="it-IT" smtClean="0"/>
-              <a:t>‹N›</a:t>
+              <a:t>‹#›</a:t>
             </a:fld>
             <a:endParaRPr lang="it-IT"/>
           </a:p>
@@ -11531,7 +11464,7 @@
           <a:p>
             <a:fld id="{6705913C-D455-491B-A56E-B276DCE62E7A}" type="datetimeFigureOut">
               <a:rPr lang="it-IT" smtClean="0"/>
-              <a:t>25/05/2019</a:t>
+              <a:t>26/05/2019</a:t>
             </a:fld>
             <a:endParaRPr lang="it-IT"/>
           </a:p>
@@ -11573,7 +11506,7 @@
           <a:p>
             <a:fld id="{F22D0480-470F-45BA-8A2B-522EE741392B}" type="slidenum">
               <a:rPr lang="it-IT" smtClean="0"/>
-              <a:t>‹N›</a:t>
+              <a:t>‹#›</a:t>
             </a:fld>
             <a:endParaRPr lang="it-IT"/>
           </a:p>
@@ -11855,7 +11788,7 @@
           <a:p>
             <a:fld id="{6705913C-D455-491B-A56E-B276DCE62E7A}" type="datetimeFigureOut">
               <a:rPr lang="it-IT" smtClean="0"/>
-              <a:t>25/05/2019</a:t>
+              <a:t>26/05/2019</a:t>
             </a:fld>
             <a:endParaRPr lang="it-IT"/>
           </a:p>
@@ -11923,7 +11856,7 @@
           <a:p>
             <a:fld id="{F22D0480-470F-45BA-8A2B-522EE741392B}" type="slidenum">
               <a:rPr lang="it-IT" smtClean="0"/>
-              <a:t>‹N›</a:t>
+              <a:t>‹#›</a:t>
             </a:fld>
             <a:endParaRPr lang="it-IT"/>
           </a:p>
@@ -12094,7 +12027,7 @@
           <a:p>
             <a:fld id="{6705913C-D455-491B-A56E-B276DCE62E7A}" type="datetimeFigureOut">
               <a:rPr lang="it-IT" smtClean="0"/>
-              <a:t>25/05/2019</a:t>
+              <a:t>26/05/2019</a:t>
             </a:fld>
             <a:endParaRPr lang="it-IT"/>
           </a:p>
@@ -12136,7 +12069,7 @@
           <a:p>
             <a:fld id="{F22D0480-470F-45BA-8A2B-522EE741392B}" type="slidenum">
               <a:rPr lang="it-IT" smtClean="0"/>
-              <a:t>‹N›</a:t>
+              <a:t>‹#›</a:t>
             </a:fld>
             <a:endParaRPr lang="it-IT"/>
           </a:p>
@@ -12274,7 +12207,7 @@
           <a:p>
             <a:fld id="{6705913C-D455-491B-A56E-B276DCE62E7A}" type="datetimeFigureOut">
               <a:rPr lang="it-IT" smtClean="0"/>
-              <a:t>25/05/2019</a:t>
+              <a:t>26/05/2019</a:t>
             </a:fld>
             <a:endParaRPr lang="it-IT"/>
           </a:p>
@@ -12316,7 +12249,7 @@
           <a:p>
             <a:fld id="{F22D0480-470F-45BA-8A2B-522EE741392B}" type="slidenum">
               <a:rPr lang="it-IT" smtClean="0"/>
-              <a:t>‹N›</a:t>
+              <a:t>‹#›</a:t>
             </a:fld>
             <a:endParaRPr lang="it-IT"/>
           </a:p>
@@ -12525,7 +12458,7 @@
           <a:p>
             <a:fld id="{6705913C-D455-491B-A56E-B276DCE62E7A}" type="datetimeFigureOut">
               <a:rPr lang="it-IT" smtClean="0"/>
-              <a:t>25/05/2019</a:t>
+              <a:t>26/05/2019</a:t>
             </a:fld>
             <a:endParaRPr lang="it-IT"/>
           </a:p>
@@ -12567,7 +12500,7 @@
           <a:p>
             <a:fld id="{F22D0480-470F-45BA-8A2B-522EE741392B}" type="slidenum">
               <a:rPr lang="it-IT" smtClean="0"/>
-              <a:t>‹N›</a:t>
+              <a:t>‹#›</a:t>
             </a:fld>
             <a:endParaRPr lang="it-IT"/>
           </a:p>
@@ -12757,7 +12690,7 @@
           <a:p>
             <a:fld id="{6705913C-D455-491B-A56E-B276DCE62E7A}" type="datetimeFigureOut">
               <a:rPr lang="it-IT" smtClean="0"/>
-              <a:t>25/05/2019</a:t>
+              <a:t>26/05/2019</a:t>
             </a:fld>
             <a:endParaRPr lang="it-IT"/>
           </a:p>
@@ -12799,7 +12732,7 @@
           <a:p>
             <a:fld id="{F22D0480-470F-45BA-8A2B-522EE741392B}" type="slidenum">
               <a:rPr lang="it-IT" smtClean="0"/>
-              <a:t>‹N›</a:t>
+              <a:t>‹#›</a:t>
             </a:fld>
             <a:endParaRPr lang="it-IT"/>
           </a:p>
@@ -13104,7 +13037,7 @@
           <a:p>
             <a:fld id="{6705913C-D455-491B-A56E-B276DCE62E7A}" type="datetimeFigureOut">
               <a:rPr lang="it-IT" smtClean="0"/>
-              <a:t>25/05/2019</a:t>
+              <a:t>26/05/2019</a:t>
             </a:fld>
             <a:endParaRPr lang="it-IT"/>
           </a:p>
@@ -13146,7 +13079,7 @@
           <a:p>
             <a:fld id="{F22D0480-470F-45BA-8A2B-522EE741392B}" type="slidenum">
               <a:rPr lang="it-IT" smtClean="0"/>
-              <a:t>‹N›</a:t>
+              <a:t>‹#›</a:t>
             </a:fld>
             <a:endParaRPr lang="it-IT"/>
           </a:p>
@@ -13222,7 +13155,7 @@
           <a:p>
             <a:fld id="{6705913C-D455-491B-A56E-B276DCE62E7A}" type="datetimeFigureOut">
               <a:rPr lang="it-IT" smtClean="0"/>
-              <a:t>25/05/2019</a:t>
+              <a:t>26/05/2019</a:t>
             </a:fld>
             <a:endParaRPr lang="it-IT"/>
           </a:p>
@@ -13264,7 +13197,7 @@
           <a:p>
             <a:fld id="{F22D0480-470F-45BA-8A2B-522EE741392B}" type="slidenum">
               <a:rPr lang="it-IT" smtClean="0"/>
-              <a:t>‹N›</a:t>
+              <a:t>‹#›</a:t>
             </a:fld>
             <a:endParaRPr lang="it-IT"/>
           </a:p>
@@ -13340,7 +13273,7 @@
           <a:p>
             <a:fld id="{6705913C-D455-491B-A56E-B276DCE62E7A}" type="datetimeFigureOut">
               <a:rPr lang="it-IT" smtClean="0"/>
-              <a:t>25/05/2019</a:t>
+              <a:t>26/05/2019</a:t>
             </a:fld>
             <a:endParaRPr lang="it-IT"/>
           </a:p>
@@ -13382,7 +13315,7 @@
           <a:p>
             <a:fld id="{F22D0480-470F-45BA-8A2B-522EE741392B}" type="slidenum">
               <a:rPr lang="it-IT" smtClean="0"/>
-              <a:t>‹N›</a:t>
+              <a:t>‹#›</a:t>
             </a:fld>
             <a:endParaRPr lang="it-IT"/>
           </a:p>
@@ -13624,7 +13557,7 @@
           <a:p>
             <a:fld id="{6705913C-D455-491B-A56E-B276DCE62E7A}" type="datetimeFigureOut">
               <a:rPr lang="it-IT" smtClean="0"/>
-              <a:t>25/05/2019</a:t>
+              <a:t>26/05/2019</a:t>
             </a:fld>
             <a:endParaRPr lang="it-IT"/>
           </a:p>
@@ -13666,7 +13599,7 @@
           <a:p>
             <a:fld id="{F22D0480-470F-45BA-8A2B-522EE741392B}" type="slidenum">
               <a:rPr lang="it-IT" smtClean="0"/>
-              <a:t>‹N›</a:t>
+              <a:t>‹#›</a:t>
             </a:fld>
             <a:endParaRPr lang="it-IT"/>
           </a:p>
@@ -13888,7 +13821,7 @@
           <a:p>
             <a:fld id="{6705913C-D455-491B-A56E-B276DCE62E7A}" type="datetimeFigureOut">
               <a:rPr lang="it-IT" smtClean="0"/>
-              <a:t>25/05/2019</a:t>
+              <a:t>26/05/2019</a:t>
             </a:fld>
             <a:endParaRPr lang="it-IT"/>
           </a:p>
@@ -13930,7 +13863,7 @@
           <a:p>
             <a:fld id="{F22D0480-470F-45BA-8A2B-522EE741392B}" type="slidenum">
               <a:rPr lang="it-IT" smtClean="0"/>
-              <a:t>‹N›</a:t>
+              <a:t>‹#›</a:t>
             </a:fld>
             <a:endParaRPr lang="it-IT"/>
           </a:p>
@@ -14102,7 +14035,7 @@
           <a:p>
             <a:fld id="{6705913C-D455-491B-A56E-B276DCE62E7A}" type="datetimeFigureOut">
               <a:rPr lang="it-IT" smtClean="0"/>
-              <a:t>25/05/2019</a:t>
+              <a:t>26/05/2019</a:t>
             </a:fld>
             <a:endParaRPr lang="it-IT"/>
           </a:p>
@@ -14181,7 +14114,7 @@
           <a:p>
             <a:fld id="{F22D0480-470F-45BA-8A2B-522EE741392B}" type="slidenum">
               <a:rPr lang="it-IT" smtClean="0"/>
-              <a:t>‹N›</a:t>
+              <a:t>‹#›</a:t>
             </a:fld>
             <a:endParaRPr lang="it-IT"/>
           </a:p>
@@ -14632,7 +14565,7 @@
           <a:p>
             <a:fld id="{6705913C-D455-491B-A56E-B276DCE62E7A}" type="datetimeFigureOut">
               <a:rPr lang="it-IT" smtClean="0"/>
-              <a:t>25/05/2019</a:t>
+              <a:t>26/05/2019</a:t>
             </a:fld>
             <a:endParaRPr lang="it-IT"/>
           </a:p>
@@ -14706,7 +14639,7 @@
           <a:p>
             <a:fld id="{F22D0480-470F-45BA-8A2B-522EE741392B}" type="slidenum">
               <a:rPr lang="it-IT" smtClean="0"/>
-              <a:t>‹N›</a:t>
+              <a:t>‹#›</a:t>
             </a:fld>
             <a:endParaRPr lang="it-IT"/>
           </a:p>
@@ -16530,7 +16463,7 @@
                 </a:solidFill>
                 <a:latin typeface="Avenir LT Std 35 Light" panose="020B0402020203020204" pitchFamily="34" charset="0"/>
               </a:rPr>
-              <a:t> Candidate modification</a:t>
+              <a:t> Edit candidate</a:t>
             </a:r>
           </a:p>
         </p:txBody>
@@ -16749,7 +16682,7 @@
                 </a:solidFill>
                 <a:latin typeface="Avenir LT Std 35 Light" panose="020B0402020203020204" pitchFamily="34" charset="0"/>
               </a:rPr>
-              <a:t> Candidate deletion</a:t>
+              <a:t> Delete candidate</a:t>
             </a:r>
           </a:p>
         </p:txBody>
@@ -16949,23 +16882,8 @@
                 </a:solidFill>
                 <a:latin typeface="Avenir LT Std 35 Light" panose="020B0402020203020204" pitchFamily="34" charset="0"/>
               </a:rPr>
-              <a:t>Candidate </a:t>
-            </a:r>
-            <a:r>
-              <a:rPr lang="it-IT" sz="3400" b="1" dirty="0" err="1">
-                <a:solidFill>
-                  <a:srgbClr val="000000"/>
-                </a:solidFill>
-                <a:latin typeface="Avenir LT Std 35 Light" panose="020B0402020203020204" pitchFamily="34" charset="0"/>
-              </a:rPr>
-              <a:t>addition</a:t>
-            </a:r>
-            <a:endParaRPr lang="it-IT" sz="3400" b="1" dirty="0">
-              <a:solidFill>
-                <a:srgbClr val="000000"/>
-              </a:solidFill>
-              <a:latin typeface="Avenir LT Std 35 Light" panose="020B0402020203020204" pitchFamily="34" charset="0"/>
-            </a:endParaRPr>
+              <a:t>Add candidate</a:t>
+            </a:r>
           </a:p>
         </p:txBody>
       </p:sp>
@@ -17015,7 +16933,7 @@
                 </a:solidFill>
                 <a:latin typeface="Avenir LT Std 35 Light" panose="020B0402020203020204" pitchFamily="34" charset="0"/>
               </a:rPr>
-              <a:t>The textfields are red when there is something wrong. Otherwise, they will be green. You can submit a candidate only if all the textfields are green.</a:t>
+              <a:t>The text fields are red when there is something wrong. Otherwise, they will be green. You can submit a candidate only if all the text fields are green.</a:t>
             </a:r>
           </a:p>
         </p:txBody>
@@ -18632,13 +18550,22 @@
               <a:buNone/>
             </a:pPr>
             <a:r>
-              <a:rPr lang="it-IT" sz="2400" dirty="0">
+              <a:rPr lang="it-IT" sz="2400" i="1" dirty="0">
                 <a:solidFill>
                   <a:schemeClr val="tx1"/>
                 </a:solidFill>
                 <a:latin typeface="Avenir LT Std 35 Light" panose="020B0402020203020204" pitchFamily="34" charset="0"/>
               </a:rPr>
-              <a:t>Alternanza Scuola Lavoro (Work and School alternation) is the innovative educational discipline which allowed us to ‘work’ for the company during our school years.</a:t>
+              <a:t>Alternanza Scuola Lavoro </a:t>
+            </a:r>
+            <a:r>
+              <a:rPr lang="it-IT" sz="2400" dirty="0">
+                <a:solidFill>
+                  <a:schemeClr val="tx1"/>
+                </a:solidFill>
+                <a:latin typeface="Avenir LT Std 35 Light" panose="020B0402020203020204" pitchFamily="34" charset="0"/>
+              </a:rPr>
+              <a:t>(School – Work experience model) is the innovative educational discipline which allowed us to ‘work’ for the company during our school years.</a:t>
             </a:r>
           </a:p>
           <a:p>
@@ -18712,7 +18639,7 @@
                 <a16:creationId xmlns:a16="http://schemas.microsoft.com/office/drawing/2014/main" id="{B13A6A14-9A86-46E6-8CE2-E92EE37A64F9}"/>
               </a:ext>
               <a:ext uri="{C183D7F6-B498-43B3-948B-1728B52AA6E4}">
-                <adec:decorative xmlns:adec="http://schemas.microsoft.com/office/drawing/2017/decorative" xmlns="" val="0"/>
+                <adec:decorative xmlns:adec="http://schemas.microsoft.com/office/drawing/2017/decorative" val="0"/>
               </a:ext>
             </a:extLst>
           </p:cNvPr>
@@ -19391,13 +19318,6 @@
   <p:clrMapOvr>
     <a:masterClrMapping/>
   </p:clrMapOvr>
-  <p:timing>
-    <p:tnLst>
-      <p:par>
-        <p:cTn id="1" dur="indefinite" restart="never" nodeType="tmRoot"/>
-      </p:par>
-    </p:tnLst>
-  </p:timing>
 </p:sld>
 </file>
 
@@ -19545,7 +19465,7 @@
                 <a16:creationId xmlns:a16="http://schemas.microsoft.com/office/drawing/2014/main" id="{B13A6A14-9A86-46E6-8CE2-E92EE37A64F9}"/>
               </a:ext>
               <a:ext uri="{C183D7F6-B498-43B3-948B-1728B52AA6E4}">
-                <adec:decorative xmlns:adec="http://schemas.microsoft.com/office/drawing/2017/decorative" xmlns="" val="0"/>
+                <adec:decorative xmlns:adec="http://schemas.microsoft.com/office/drawing/2017/decorative" val="0"/>
               </a:ext>
             </a:extLst>
           </p:cNvPr>
@@ -19751,7 +19671,7 @@
                 <a16:creationId xmlns:a16="http://schemas.microsoft.com/office/drawing/2014/main" id="{B13A6A14-9A86-46E6-8CE2-E92EE37A64F9}"/>
               </a:ext>
               <a:ext uri="{C183D7F6-B498-43B3-948B-1728B52AA6E4}">
-                <adec:decorative xmlns:adec="http://schemas.microsoft.com/office/drawing/2017/decorative" xmlns="" val="0"/>
+                <adec:decorative xmlns:adec="http://schemas.microsoft.com/office/drawing/2017/decorative" val="0"/>
               </a:ext>
             </a:extLst>
           </p:cNvPr>
@@ -20041,7 +19961,7 @@
                 <a16:creationId xmlns:a16="http://schemas.microsoft.com/office/drawing/2014/main" id="{B13A6A14-9A86-46E6-8CE2-E92EE37A64F9}"/>
               </a:ext>
               <a:ext uri="{C183D7F6-B498-43B3-948B-1728B52AA6E4}">
-                <adec:decorative xmlns:adec="http://schemas.microsoft.com/office/drawing/2017/decorative" xmlns="" val="0"/>
+                <adec:decorative xmlns:adec="http://schemas.microsoft.com/office/drawing/2017/decorative" val="0"/>
               </a:ext>
             </a:extLst>
           </p:cNvPr>
@@ -20277,7 +20197,7 @@
                 <a16:creationId xmlns:a16="http://schemas.microsoft.com/office/drawing/2014/main" id="{B13A6A14-9A86-46E6-8CE2-E92EE37A64F9}"/>
               </a:ext>
               <a:ext uri="{C183D7F6-B498-43B3-948B-1728B52AA6E4}">
-                <adec:decorative xmlns:adec="http://schemas.microsoft.com/office/drawing/2017/decorative" xmlns="" val="0"/>
+                <adec:decorative xmlns:adec="http://schemas.microsoft.com/office/drawing/2017/decorative" val="0"/>
               </a:ext>
             </a:extLst>
           </p:cNvPr>
@@ -20942,13 +20862,6 @@
   <p:clrMapOvr>
     <a:masterClrMapping/>
   </p:clrMapOvr>
-  <p:timing>
-    <p:tnLst>
-      <p:par>
-        <p:cTn id="1" dur="indefinite" restart="never" nodeType="tmRoot"/>
-      </p:par>
-    </p:tnLst>
-  </p:timing>
 </p:sld>
 </file>
 
@@ -20987,54 +20900,18 @@
         </p:spPr>
         <p:txBody>
           <a:bodyPr>
-            <a:normAutofit fontScale="90000"/>
+            <a:normAutofit/>
           </a:bodyPr>
           <a:lstStyle/>
           <a:p>
             <a:r>
-              <a:rPr lang="it-IT" sz="3600" b="1" dirty="0">
+              <a:rPr lang="en-GB" sz="3600" b="1" dirty="0">
                 <a:solidFill>
                   <a:srgbClr val="000000"/>
                 </a:solidFill>
                 <a:latin typeface="Avenir LT Std 35 Light" panose="020B0402020203020204" pitchFamily="34" charset="0"/>
               </a:rPr>
-              <a:t>How </a:t>
-            </a:r>
-            <a:r>
-              <a:rPr lang="it-IT" sz="3600" b="1" dirty="0" err="1">
-                <a:solidFill>
-                  <a:srgbClr val="000000"/>
-                </a:solidFill>
-                <a:latin typeface="Avenir LT Std 35 Light" panose="020B0402020203020204" pitchFamily="34" charset="0"/>
-              </a:rPr>
-              <a:t>is</a:t>
-            </a:r>
-            <a:r>
-              <a:rPr lang="it-IT" sz="3600" b="1" dirty="0">
-                <a:solidFill>
-                  <a:srgbClr val="000000"/>
-                </a:solidFill>
-                <a:latin typeface="Avenir LT Std 35 Light" panose="020B0402020203020204" pitchFamily="34" charset="0"/>
-              </a:rPr>
-              <a:t> </a:t>
-            </a:r>
-            <a:r>
-              <a:rPr lang="it-IT" sz="3600" b="1" dirty="0" err="1">
-                <a:solidFill>
-                  <a:srgbClr val="000000"/>
-                </a:solidFill>
-                <a:latin typeface="Avenir LT Std 35 Light" panose="020B0402020203020204" pitchFamily="34" charset="0"/>
-              </a:rPr>
-              <a:t>it</a:t>
-            </a:r>
-            <a:r>
-              <a:rPr lang="it-IT" sz="3600" b="1" dirty="0">
-                <a:solidFill>
-                  <a:srgbClr val="000000"/>
-                </a:solidFill>
-                <a:latin typeface="Avenir LT Std 35 Light" panose="020B0402020203020204" pitchFamily="34" charset="0"/>
-              </a:rPr>
-              <a:t> made?</a:t>
+              <a:t>How is it made?</a:t>
             </a:r>
           </a:p>
         </p:txBody>
@@ -21578,13 +21455,6 @@
   <p:clrMapOvr>
     <a:masterClrMapping/>
   </p:clrMapOvr>
-  <p:timing>
-    <p:tnLst>
-      <p:par>
-        <p:cTn id="1" dur="indefinite" restart="never" nodeType="tmRoot"/>
-      </p:par>
-    </p:tnLst>
-  </p:timing>
 </p:sld>
 </file>
 

</xml_diff>